<commit_message>
Improvement on Dice coefficient plot
</commit_message>
<xml_diff>
--- a/publication-figures-landscape.pptx
+++ b/publication-figures-landscape.pptx
@@ -3183,7 +3183,7 @@
               </a:spcAft>
             </a:pPr>
             <a:r>
-              <a:rPr lang="en-GB" sz="300" u="none" strike="noStrike">
+              <a:rPr lang="en-GB" sz="300" u="none" strike="noStrike" dirty="0">
                 <a:effectLst/>
                 <a:latin typeface="Arial"/>
                 <a:ea typeface="ＭＳ 明朝"/>
@@ -3191,7 +3191,7 @@
               </a:rPr>
               <a:t> </a:t>
             </a:r>
-            <a:endParaRPr lang="en-GB" sz="1200">
+            <a:endParaRPr lang="en-GB" sz="1200" dirty="0">
               <a:effectLst/>
               <a:ea typeface="ＭＳ 明朝"/>
               <a:cs typeface="Times New Roman"/>
@@ -3204,7 +3204,7 @@
               </a:spcAft>
             </a:pPr>
             <a:r>
-              <a:rPr lang="en-GB" sz="1000" u="sng">
+              <a:rPr lang="en-GB" sz="1000" u="sng" dirty="0">
                 <a:effectLst/>
                 <a:latin typeface="Arial"/>
                 <a:ea typeface="ＭＳ 明朝"/>
@@ -3212,7 +3212,7 @@
               </a:rPr>
               <a:t>Figure 2</a:t>
             </a:r>
-            <a:endParaRPr lang="en-GB" sz="1200">
+            <a:endParaRPr lang="en-GB" sz="1200" dirty="0">
               <a:effectLst/>
               <a:ea typeface="ＭＳ 明朝"/>
               <a:cs typeface="Times New Roman"/>
@@ -3225,15 +3225,51 @@
               </a:spcAft>
             </a:pPr>
             <a:r>
-              <a:rPr lang="en-GB" sz="1000">
+              <a:rPr lang="en-GB" sz="1000" dirty="0">
                 <a:effectLst/>
                 <a:latin typeface="Arial"/>
                 <a:ea typeface="ＭＳ 明朝"/>
                 <a:cs typeface="Times New Roman"/>
               </a:rPr>
-              <a:t>Dice coefficients comparing the thresholded positive and negative T-statistic maps computed using each software package and inference method for each of the three reproduced studies.  Dice is the size of the overlapping region of two images divided by the average size of each region. In this context, a Dice coefficient of 1 would indicate perfect agreement between software on the regions of significant activation, whereas a coefficient of 0 would imply that no voxel was declared significant in both packages after thresholding the T-statistic images. </a:t>
-            </a:r>
-            <a:endParaRPr lang="en-GB" sz="1200">
+              <a:t>Dice coefficients comparing the </a:t>
+            </a:r>
+            <a:r>
+              <a:rPr lang="en-GB" sz="1000" dirty="0" err="1">
+                <a:effectLst/>
+                <a:latin typeface="Arial"/>
+                <a:ea typeface="ＭＳ 明朝"/>
+                <a:cs typeface="Times New Roman"/>
+              </a:rPr>
+              <a:t>thresholded</a:t>
+            </a:r>
+            <a:r>
+              <a:rPr lang="en-GB" sz="1000" dirty="0">
+                <a:effectLst/>
+                <a:latin typeface="Arial"/>
+                <a:ea typeface="ＭＳ 明朝"/>
+                <a:cs typeface="Times New Roman"/>
+              </a:rPr>
+              <a:t> positive and negative T-statistic maps computed using each software package and inference method for each of the three reproduced studies.  Dice is the size of the overlapping region of two images divided by the average size of each region. In this context, a Dice coefficient of 1 would indicate perfect agreement between software on the regions of significant activation, whereas a coefficient of 0 would imply that no voxel was declared significant in both packages after </a:t>
+            </a:r>
+            <a:r>
+              <a:rPr lang="en-GB" sz="1000" dirty="0" err="1">
+                <a:effectLst/>
+                <a:latin typeface="Arial"/>
+                <a:ea typeface="ＭＳ 明朝"/>
+                <a:cs typeface="Times New Roman"/>
+              </a:rPr>
+              <a:t>thresholding</a:t>
+            </a:r>
+            <a:r>
+              <a:rPr lang="en-GB" sz="1000" dirty="0">
+                <a:effectLst/>
+                <a:latin typeface="Arial"/>
+                <a:ea typeface="ＭＳ 明朝"/>
+                <a:cs typeface="Times New Roman"/>
+              </a:rPr>
+              <a:t> the T-statistic images. </a:t>
+            </a:r>
+            <a:endParaRPr lang="en-GB" sz="1200" dirty="0">
               <a:effectLst/>
               <a:ea typeface="ＭＳ 明朝"/>
               <a:cs typeface="Times New Roman"/>
@@ -3246,7 +3282,7 @@
               </a:spcAft>
             </a:pPr>
             <a:r>
-              <a:rPr lang="en-GB" sz="1200">
+              <a:rPr lang="en-GB" sz="1200" dirty="0">
                 <a:effectLst/>
                 <a:ea typeface="ＭＳ 明朝"/>
                 <a:cs typeface="Times New Roman"/>

</xml_diff>

<commit_message>
updates to publication figures
</commit_message>
<xml_diff>
--- a/publication-figures-landscape.pptx
+++ b/publication-figures-landscape.pptx
@@ -289,7 +289,7 @@
           <a:p>
             <a:fld id="{A3E64614-E88D-664F-AD75-0DDFB9446223}" type="datetimeFigureOut">
               <a:rPr lang="en-US" smtClean="0"/>
-              <a:t>18/01/18</a:t>
+              <a:t>07/03/18</a:t>
             </a:fld>
             <a:endParaRPr lang="en-US"/>
           </a:p>
@@ -459,7 +459,7 @@
           <a:p>
             <a:fld id="{A3E64614-E88D-664F-AD75-0DDFB9446223}" type="datetimeFigureOut">
               <a:rPr lang="en-US" smtClean="0"/>
-              <a:t>18/01/18</a:t>
+              <a:t>07/03/18</a:t>
             </a:fld>
             <a:endParaRPr lang="en-US"/>
           </a:p>
@@ -639,7 +639,7 @@
           <a:p>
             <a:fld id="{A3E64614-E88D-664F-AD75-0DDFB9446223}" type="datetimeFigureOut">
               <a:rPr lang="en-US" smtClean="0"/>
-              <a:t>18/01/18</a:t>
+              <a:t>07/03/18</a:t>
             </a:fld>
             <a:endParaRPr lang="en-US"/>
           </a:p>
@@ -809,7 +809,7 @@
           <a:p>
             <a:fld id="{A3E64614-E88D-664F-AD75-0DDFB9446223}" type="datetimeFigureOut">
               <a:rPr lang="en-US" smtClean="0"/>
-              <a:t>18/01/18</a:t>
+              <a:t>07/03/18</a:t>
             </a:fld>
             <a:endParaRPr lang="en-US"/>
           </a:p>
@@ -1055,7 +1055,7 @@
           <a:p>
             <a:fld id="{A3E64614-E88D-664F-AD75-0DDFB9446223}" type="datetimeFigureOut">
               <a:rPr lang="en-US" smtClean="0"/>
-              <a:t>18/01/18</a:t>
+              <a:t>07/03/18</a:t>
             </a:fld>
             <a:endParaRPr lang="en-US"/>
           </a:p>
@@ -1343,7 +1343,7 @@
           <a:p>
             <a:fld id="{A3E64614-E88D-664F-AD75-0DDFB9446223}" type="datetimeFigureOut">
               <a:rPr lang="en-US" smtClean="0"/>
-              <a:t>18/01/18</a:t>
+              <a:t>07/03/18</a:t>
             </a:fld>
             <a:endParaRPr lang="en-US"/>
           </a:p>
@@ -1765,7 +1765,7 @@
           <a:p>
             <a:fld id="{A3E64614-E88D-664F-AD75-0DDFB9446223}" type="datetimeFigureOut">
               <a:rPr lang="en-US" smtClean="0"/>
-              <a:t>18/01/18</a:t>
+              <a:t>07/03/18</a:t>
             </a:fld>
             <a:endParaRPr lang="en-US"/>
           </a:p>
@@ -1883,7 +1883,7 @@
           <a:p>
             <a:fld id="{A3E64614-E88D-664F-AD75-0DDFB9446223}" type="datetimeFigureOut">
               <a:rPr lang="en-US" smtClean="0"/>
-              <a:t>18/01/18</a:t>
+              <a:t>07/03/18</a:t>
             </a:fld>
             <a:endParaRPr lang="en-US"/>
           </a:p>
@@ -1978,7 +1978,7 @@
           <a:p>
             <a:fld id="{A3E64614-E88D-664F-AD75-0DDFB9446223}" type="datetimeFigureOut">
               <a:rPr lang="en-US" smtClean="0"/>
-              <a:t>18/01/18</a:t>
+              <a:t>07/03/18</a:t>
             </a:fld>
             <a:endParaRPr lang="en-US"/>
           </a:p>
@@ -2255,7 +2255,7 @@
           <a:p>
             <a:fld id="{A3E64614-E88D-664F-AD75-0DDFB9446223}" type="datetimeFigureOut">
               <a:rPr lang="en-US" smtClean="0"/>
-              <a:t>18/01/18</a:t>
+              <a:t>07/03/18</a:t>
             </a:fld>
             <a:endParaRPr lang="en-US"/>
           </a:p>
@@ -2508,7 +2508,7 @@
           <a:p>
             <a:fld id="{A3E64614-E88D-664F-AD75-0DDFB9446223}" type="datetimeFigureOut">
               <a:rPr lang="en-US" smtClean="0"/>
-              <a:t>18/01/18</a:t>
+              <a:t>07/03/18</a:t>
             </a:fld>
             <a:endParaRPr lang="en-US"/>
           </a:p>
@@ -2721,7 +2721,7 @@
           <a:p>
             <a:fld id="{A3E64614-E88D-664F-AD75-0DDFB9446223}" type="datetimeFigureOut">
               <a:rPr lang="en-US" smtClean="0"/>
-              <a:t>18/01/18</a:t>
+              <a:t>07/03/18</a:t>
             </a:fld>
             <a:endParaRPr lang="en-US"/>
           </a:p>
@@ -3096,202 +3096,217 @@
           <a:chExt cx="0" cy="0"/>
         </a:xfrm>
       </p:grpSpPr>
-      <p:pic>
-        <p:nvPicPr>
-          <p:cNvPr id="4" name="Picture 3" descr="Macintosh HD:Users:maullz:Desktop:Software_Comparison:figures:figures:Slide26.png"/>
-          <p:cNvPicPr/>
+      <p:grpSp>
+        <p:nvGrpSpPr>
+          <p:cNvPr id="2" name="Group 1"/>
+          <p:cNvGrpSpPr/>
           <p:nvPr/>
-        </p:nvPicPr>
-        <p:blipFill>
-          <a:blip r:embed="rId2">
+        </p:nvGrpSpPr>
+        <p:grpSpPr>
+          <a:xfrm>
+            <a:off x="1236346" y="360694"/>
+            <a:ext cx="7470140" cy="6169660"/>
+            <a:chOff x="1236346" y="360694"/>
+            <a:chExt cx="7470140" cy="6169660"/>
+          </a:xfrm>
+        </p:grpSpPr>
+        <p:pic>
+          <p:nvPicPr>
+            <p:cNvPr id="4" name="Picture 3" descr="Macintosh HD:Users:maullz:Desktop:Software_Comparison:figures:figures:Slide26.png"/>
+            <p:cNvPicPr/>
+            <p:nvPr/>
+          </p:nvPicPr>
+          <p:blipFill>
+            <a:blip r:embed="rId2">
+              <a:extLst>
+                <a:ext uri="{28A0092B-C50C-407E-A947-70E740481C1C}">
+                  <a14:useLocalDpi xmlns:a14="http://schemas.microsoft.com/office/drawing/2010/main" val="0"/>
+                </a:ext>
+              </a:extLst>
+            </a:blip>
+            <a:srcRect/>
+            <a:stretch>
+              <a:fillRect/>
+            </a:stretch>
+          </p:blipFill>
+          <p:spPr bwMode="auto">
+            <a:xfrm rot="5400000">
+              <a:off x="2335213" y="-738173"/>
+              <a:ext cx="5272405" cy="7470140"/>
+            </a:xfrm>
+            <a:prstGeom prst="rect">
+              <a:avLst/>
+            </a:prstGeom>
+            <a:noFill/>
+            <a:ln>
+              <a:noFill/>
+            </a:ln>
+          </p:spPr>
+        </p:pic>
+        <p:sp>
+          <p:nvSpPr>
+            <p:cNvPr id="5" name="Text Box 5"/>
+            <p:cNvSpPr txBox="1"/>
+            <p:nvPr/>
+          </p:nvSpPr>
+          <p:spPr>
+            <a:xfrm>
+              <a:off x="1352551" y="5501654"/>
+              <a:ext cx="7200900" cy="1028700"/>
+            </a:xfrm>
+            <a:prstGeom prst="rect">
+              <a:avLst/>
+            </a:prstGeom>
+            <a:noFill/>
+            <a:ln>
+              <a:noFill/>
+            </a:ln>
+            <a:effectLst/>
             <a:extLst>
-              <a:ext uri="{28A0092B-C50C-407E-A947-70E740481C1C}">
-                <a14:useLocalDpi xmlns:a14="http://schemas.microsoft.com/office/drawing/2010/main" val="0"/>
+              <a:ext uri="{C572A759-6A51-4108-AA02-DFA0A04FC94B}">
+                <ma14:wrappingTextBoxFlag xmlns:ma14="http://schemas.microsoft.com/office/mac/drawingml/2011/main"/>
               </a:ext>
             </a:extLst>
-          </a:blip>
-          <a:srcRect/>
-          <a:stretch>
-            <a:fillRect/>
-          </a:stretch>
-        </p:blipFill>
-        <p:spPr bwMode="auto">
-          <a:xfrm rot="5400000">
-            <a:off x="2335213" y="-738173"/>
-            <a:ext cx="5272405" cy="7470140"/>
-          </a:xfrm>
-          <a:prstGeom prst="rect">
-            <a:avLst/>
-          </a:prstGeom>
-          <a:noFill/>
-          <a:ln>
-            <a:noFill/>
-          </a:ln>
-        </p:spPr>
-      </p:pic>
-      <p:sp>
-        <p:nvSpPr>
-          <p:cNvPr id="5" name="Text Box 5"/>
-          <p:cNvSpPr txBox="1"/>
-          <p:nvPr/>
-        </p:nvSpPr>
-        <p:spPr>
-          <a:xfrm>
-            <a:off x="1352551" y="5501654"/>
-            <a:ext cx="7200900" cy="1028700"/>
-          </a:xfrm>
-          <a:prstGeom prst="rect">
-            <a:avLst/>
-          </a:prstGeom>
-          <a:noFill/>
-          <a:ln>
-            <a:noFill/>
-          </a:ln>
-          <a:effectLst/>
-          <a:extLst>
-            <a:ext uri="{C572A759-6A51-4108-AA02-DFA0A04FC94B}">
-              <ma14:wrappingTextBoxFlag xmlns:ma14="http://schemas.microsoft.com/office/mac/drawingml/2011/main"/>
-            </a:ext>
-          </a:extLst>
-        </p:spPr>
-        <p:style>
-          <a:lnRef idx="0">
-            <a:schemeClr val="accent1"/>
-          </a:lnRef>
-          <a:fillRef idx="0">
-            <a:schemeClr val="accent1"/>
-          </a:fillRef>
-          <a:effectRef idx="0">
-            <a:schemeClr val="accent1"/>
-          </a:effectRef>
-          <a:fontRef idx="minor">
-            <a:schemeClr val="dk1"/>
-          </a:fontRef>
-        </p:style>
-        <p:txBody>
-          <a:bodyPr rot="0" spcFirstLastPara="0" vert="horz" wrap="square" lIns="91440" tIns="45720" rIns="91440" bIns="45720" numCol="1" spcCol="0" rtlCol="0" fromWordArt="0" anchor="t" anchorCtr="0" forceAA="0" compatLnSpc="1">
-            <a:prstTxWarp prst="textNoShape">
-              <a:avLst/>
-            </a:prstTxWarp>
-            <a:noAutofit/>
-          </a:bodyPr>
-          <a:lstStyle/>
-          <a:p>
-            <a:pPr>
-              <a:spcAft>
-                <a:spcPts val="0"/>
-              </a:spcAft>
-            </a:pPr>
-            <a:r>
-              <a:rPr lang="en-GB" sz="300" u="none" strike="noStrike" dirty="0">
-                <a:effectLst/>
-                <a:latin typeface="Arial"/>
-                <a:ea typeface="ＭＳ 明朝"/>
-                <a:cs typeface="Times New Roman"/>
-              </a:rPr>
-              <a:t> </a:t>
-            </a:r>
-            <a:endParaRPr lang="en-GB" sz="1200" dirty="0">
-              <a:effectLst/>
-              <a:ea typeface="ＭＳ 明朝"/>
-              <a:cs typeface="Times New Roman"/>
-            </a:endParaRPr>
-          </a:p>
-          <a:p>
-            <a:pPr>
-              <a:spcAft>
-                <a:spcPts val="0"/>
-              </a:spcAft>
-            </a:pPr>
-            <a:r>
-              <a:rPr lang="en-GB" sz="1000" u="sng" dirty="0">
-                <a:effectLst/>
-                <a:latin typeface="Arial"/>
-                <a:ea typeface="ＭＳ 明朝"/>
-                <a:cs typeface="Times New Roman"/>
-              </a:rPr>
-              <a:t>Figure 2</a:t>
-            </a:r>
-            <a:endParaRPr lang="en-GB" sz="1200" dirty="0">
-              <a:effectLst/>
-              <a:ea typeface="ＭＳ 明朝"/>
-              <a:cs typeface="Times New Roman"/>
-            </a:endParaRPr>
-          </a:p>
-          <a:p>
-            <a:pPr>
-              <a:spcAft>
-                <a:spcPts val="0"/>
-              </a:spcAft>
-            </a:pPr>
-            <a:r>
-              <a:rPr lang="en-GB" sz="1000" dirty="0">
-                <a:effectLst/>
-                <a:latin typeface="Arial"/>
-                <a:ea typeface="ＭＳ 明朝"/>
-                <a:cs typeface="Times New Roman"/>
-              </a:rPr>
-              <a:t>Dice coefficients comparing the </a:t>
-            </a:r>
-            <a:r>
-              <a:rPr lang="en-GB" sz="1000" dirty="0" err="1">
-                <a:effectLst/>
-                <a:latin typeface="Arial"/>
-                <a:ea typeface="ＭＳ 明朝"/>
-                <a:cs typeface="Times New Roman"/>
-              </a:rPr>
-              <a:t>thresholded</a:t>
-            </a:r>
-            <a:r>
-              <a:rPr lang="en-GB" sz="1000" dirty="0">
-                <a:effectLst/>
-                <a:latin typeface="Arial"/>
-                <a:ea typeface="ＭＳ 明朝"/>
-                <a:cs typeface="Times New Roman"/>
-              </a:rPr>
-              <a:t> positive and negative T-statistic maps computed using each software package and inference method for each of the three reproduced studies.  Dice is the size of the overlapping region of two images divided by the average size of each region. In this context, a Dice coefficient of 1 would indicate perfect agreement between software on the regions of significant activation, whereas a coefficient of 0 would imply that no voxel was declared significant in both packages after </a:t>
-            </a:r>
-            <a:r>
-              <a:rPr lang="en-GB" sz="1000" dirty="0" err="1">
-                <a:effectLst/>
-                <a:latin typeface="Arial"/>
-                <a:ea typeface="ＭＳ 明朝"/>
-                <a:cs typeface="Times New Roman"/>
-              </a:rPr>
-              <a:t>thresholding</a:t>
-            </a:r>
-            <a:r>
-              <a:rPr lang="en-GB" sz="1000" dirty="0">
-                <a:effectLst/>
-                <a:latin typeface="Arial"/>
-                <a:ea typeface="ＭＳ 明朝"/>
-                <a:cs typeface="Times New Roman"/>
-              </a:rPr>
-              <a:t> the T-statistic images. </a:t>
-            </a:r>
-            <a:endParaRPr lang="en-GB" sz="1200" dirty="0">
-              <a:effectLst/>
-              <a:ea typeface="ＭＳ 明朝"/>
-              <a:cs typeface="Times New Roman"/>
-            </a:endParaRPr>
-          </a:p>
-          <a:p>
-            <a:pPr>
-              <a:spcAft>
-                <a:spcPts val="0"/>
-              </a:spcAft>
-            </a:pPr>
-            <a:r>
-              <a:rPr lang="en-GB" sz="1200" dirty="0">
+          </p:spPr>
+          <p:style>
+            <a:lnRef idx="0">
+              <a:schemeClr val="accent1"/>
+            </a:lnRef>
+            <a:fillRef idx="0">
+              <a:schemeClr val="accent1"/>
+            </a:fillRef>
+            <a:effectRef idx="0">
+              <a:schemeClr val="accent1"/>
+            </a:effectRef>
+            <a:fontRef idx="minor">
+              <a:schemeClr val="dk1"/>
+            </a:fontRef>
+          </p:style>
+          <p:txBody>
+            <a:bodyPr rot="0" spcFirstLastPara="0" vert="horz" wrap="square" lIns="91440" tIns="45720" rIns="91440" bIns="45720" numCol="1" spcCol="0" rtlCol="0" fromWordArt="0" anchor="t" anchorCtr="0" forceAA="0" compatLnSpc="1">
+              <a:prstTxWarp prst="textNoShape">
+                <a:avLst/>
+              </a:prstTxWarp>
+              <a:noAutofit/>
+            </a:bodyPr>
+            <a:lstStyle/>
+            <a:p>
+              <a:pPr>
+                <a:spcAft>
+                  <a:spcPts val="0"/>
+                </a:spcAft>
+              </a:pPr>
+              <a:r>
+                <a:rPr lang="en-GB" sz="300" u="none" strike="noStrike" dirty="0">
+                  <a:effectLst/>
+                  <a:latin typeface="Arial"/>
+                  <a:ea typeface="ＭＳ 明朝"/>
+                  <a:cs typeface="Times New Roman"/>
+                </a:rPr>
+                <a:t> </a:t>
+              </a:r>
+              <a:endParaRPr lang="en-GB" sz="1200" dirty="0">
                 <a:effectLst/>
                 <a:ea typeface="ＭＳ 明朝"/>
                 <a:cs typeface="Times New Roman"/>
-              </a:rPr>
-              <a:t> </a:t>
-            </a:r>
-          </a:p>
-        </p:txBody>
-      </p:sp>
+              </a:endParaRPr>
+            </a:p>
+            <a:p>
+              <a:pPr>
+                <a:spcAft>
+                  <a:spcPts val="0"/>
+                </a:spcAft>
+              </a:pPr>
+              <a:r>
+                <a:rPr lang="en-GB" sz="1000" u="sng" dirty="0">
+                  <a:effectLst/>
+                  <a:latin typeface="Arial"/>
+                  <a:ea typeface="ＭＳ 明朝"/>
+                  <a:cs typeface="Times New Roman"/>
+                </a:rPr>
+                <a:t>Figure 2</a:t>
+              </a:r>
+              <a:endParaRPr lang="en-GB" sz="1200" dirty="0">
+                <a:effectLst/>
+                <a:ea typeface="ＭＳ 明朝"/>
+                <a:cs typeface="Times New Roman"/>
+              </a:endParaRPr>
+            </a:p>
+            <a:p>
+              <a:pPr>
+                <a:spcAft>
+                  <a:spcPts val="0"/>
+                </a:spcAft>
+              </a:pPr>
+              <a:r>
+                <a:rPr lang="en-GB" sz="1000" dirty="0">
+                  <a:effectLst/>
+                  <a:latin typeface="Arial"/>
+                  <a:ea typeface="ＭＳ 明朝"/>
+                  <a:cs typeface="Times New Roman"/>
+                </a:rPr>
+                <a:t>Dice coefficients comparing the </a:t>
+              </a:r>
+              <a:r>
+                <a:rPr lang="en-GB" sz="1000" dirty="0" err="1">
+                  <a:effectLst/>
+                  <a:latin typeface="Arial"/>
+                  <a:ea typeface="ＭＳ 明朝"/>
+                  <a:cs typeface="Times New Roman"/>
+                </a:rPr>
+                <a:t>thresholded</a:t>
+              </a:r>
+              <a:r>
+                <a:rPr lang="en-GB" sz="1000" dirty="0">
+                  <a:effectLst/>
+                  <a:latin typeface="Arial"/>
+                  <a:ea typeface="ＭＳ 明朝"/>
+                  <a:cs typeface="Times New Roman"/>
+                </a:rPr>
+                <a:t> positive and negative T-statistic maps computed using each software package and inference method for each of the three reproduced studies.  Dice is the size of the overlapping region of two images divided by the average size of each region. In this context, a Dice coefficient of 1 would indicate perfect agreement between software on the regions of significant activation, whereas a coefficient of 0 would imply that no voxel was declared significant in both packages after </a:t>
+              </a:r>
+              <a:r>
+                <a:rPr lang="en-GB" sz="1000" dirty="0" err="1">
+                  <a:effectLst/>
+                  <a:latin typeface="Arial"/>
+                  <a:ea typeface="ＭＳ 明朝"/>
+                  <a:cs typeface="Times New Roman"/>
+                </a:rPr>
+                <a:t>thresholding</a:t>
+              </a:r>
+              <a:r>
+                <a:rPr lang="en-GB" sz="1000" dirty="0">
+                  <a:effectLst/>
+                  <a:latin typeface="Arial"/>
+                  <a:ea typeface="ＭＳ 明朝"/>
+                  <a:cs typeface="Times New Roman"/>
+                </a:rPr>
+                <a:t> the T-statistic images. </a:t>
+              </a:r>
+              <a:endParaRPr lang="en-GB" sz="1200" dirty="0">
+                <a:effectLst/>
+                <a:ea typeface="ＭＳ 明朝"/>
+                <a:cs typeface="Times New Roman"/>
+              </a:endParaRPr>
+            </a:p>
+            <a:p>
+              <a:pPr>
+                <a:spcAft>
+                  <a:spcPts val="0"/>
+                </a:spcAft>
+              </a:pPr>
+              <a:r>
+                <a:rPr lang="en-GB" sz="1200" dirty="0">
+                  <a:effectLst/>
+                  <a:ea typeface="ＭＳ 明朝"/>
+                  <a:cs typeface="Times New Roman"/>
+                </a:rPr>
+                <a:t> </a:t>
+              </a:r>
+            </a:p>
+          </p:txBody>
+        </p:sp>
+      </p:grpSp>
     </p:spTree>
     <p:extLst>
       <p:ext uri="{BB962C8B-B14F-4D97-AF65-F5344CB8AC3E}">
@@ -3322,166 +3337,181 @@
           <a:chExt cx="0" cy="0"/>
         </a:xfrm>
       </p:grpSpPr>
-      <p:pic>
-        <p:nvPicPr>
-          <p:cNvPr id="4" name="Picture 3" descr="Macintosh HD:Users:maullz:Desktop:Software_Comparison:figures:figures:Slide16.png"/>
-          <p:cNvPicPr/>
+      <p:grpSp>
+        <p:nvGrpSpPr>
+          <p:cNvPr id="2" name="Group 1"/>
+          <p:cNvGrpSpPr/>
           <p:nvPr/>
-        </p:nvPicPr>
-        <p:blipFill>
-          <a:blip r:embed="rId2">
+        </p:nvGrpSpPr>
+        <p:grpSpPr>
+          <a:xfrm>
+            <a:off x="1180465" y="341586"/>
+            <a:ext cx="7470140" cy="6171565"/>
+            <a:chOff x="1180465" y="341586"/>
+            <a:chExt cx="7470140" cy="6171565"/>
+          </a:xfrm>
+        </p:grpSpPr>
+        <p:pic>
+          <p:nvPicPr>
+            <p:cNvPr id="4" name="Picture 3" descr="Macintosh HD:Users:maullz:Desktop:Software_Comparison:figures:figures:Slide16.png"/>
+            <p:cNvPicPr/>
+            <p:nvPr/>
+          </p:nvPicPr>
+          <p:blipFill>
+            <a:blip r:embed="rId2">
+              <a:extLst>
+                <a:ext uri="{28A0092B-C50C-407E-A947-70E740481C1C}">
+                  <a14:useLocalDpi xmlns:a14="http://schemas.microsoft.com/office/drawing/2010/main" val="0"/>
+                </a:ext>
+              </a:extLst>
+            </a:blip>
+            <a:srcRect/>
+            <a:stretch>
+              <a:fillRect/>
+            </a:stretch>
+          </p:blipFill>
+          <p:spPr bwMode="auto">
+            <a:xfrm rot="5400000">
+              <a:off x="2279332" y="-757281"/>
+              <a:ext cx="5272405" cy="7470140"/>
+            </a:xfrm>
+            <a:prstGeom prst="rect">
+              <a:avLst/>
+            </a:prstGeom>
+            <a:noFill/>
+            <a:ln>
+              <a:noFill/>
+            </a:ln>
+          </p:spPr>
+        </p:pic>
+        <p:sp>
+          <p:nvSpPr>
+            <p:cNvPr id="5" name="Text Box 31"/>
+            <p:cNvSpPr txBox="1"/>
+            <p:nvPr/>
+          </p:nvSpPr>
+          <p:spPr>
+            <a:xfrm>
+              <a:off x="1409700" y="5484451"/>
+              <a:ext cx="7086600" cy="1028700"/>
+            </a:xfrm>
+            <a:prstGeom prst="rect">
+              <a:avLst/>
+            </a:prstGeom>
+            <a:noFill/>
+            <a:ln>
+              <a:noFill/>
+            </a:ln>
+            <a:effectLst/>
             <a:extLst>
-              <a:ext uri="{28A0092B-C50C-407E-A947-70E740481C1C}">
-                <a14:useLocalDpi xmlns:a14="http://schemas.microsoft.com/office/drawing/2010/main" val="0"/>
+              <a:ext uri="{C572A759-6A51-4108-AA02-DFA0A04FC94B}">
+                <ma14:wrappingTextBoxFlag xmlns:ma14="http://schemas.microsoft.com/office/mac/drawingml/2011/main"/>
               </a:ext>
             </a:extLst>
-          </a:blip>
-          <a:srcRect/>
-          <a:stretch>
-            <a:fillRect/>
-          </a:stretch>
-        </p:blipFill>
-        <p:spPr bwMode="auto">
-          <a:xfrm rot="5400000">
-            <a:off x="2279332" y="-757281"/>
-            <a:ext cx="5272405" cy="7470140"/>
-          </a:xfrm>
-          <a:prstGeom prst="rect">
-            <a:avLst/>
-          </a:prstGeom>
-          <a:noFill/>
-          <a:ln>
-            <a:noFill/>
-          </a:ln>
-        </p:spPr>
-      </p:pic>
-      <p:sp>
-        <p:nvSpPr>
-          <p:cNvPr id="5" name="Text Box 31"/>
-          <p:cNvSpPr txBox="1"/>
-          <p:nvPr/>
-        </p:nvSpPr>
-        <p:spPr>
-          <a:xfrm>
-            <a:off x="1409700" y="5484451"/>
-            <a:ext cx="7086600" cy="1028700"/>
-          </a:xfrm>
-          <a:prstGeom prst="rect">
-            <a:avLst/>
-          </a:prstGeom>
-          <a:noFill/>
-          <a:ln>
-            <a:noFill/>
-          </a:ln>
-          <a:effectLst/>
-          <a:extLst>
-            <a:ext uri="{C572A759-6A51-4108-AA02-DFA0A04FC94B}">
-              <ma14:wrappingTextBoxFlag xmlns:ma14="http://schemas.microsoft.com/office/mac/drawingml/2011/main"/>
-            </a:ext>
-          </a:extLst>
-        </p:spPr>
-        <p:style>
-          <a:lnRef idx="0">
-            <a:schemeClr val="accent1"/>
-          </a:lnRef>
-          <a:fillRef idx="0">
-            <a:schemeClr val="accent1"/>
-          </a:fillRef>
-          <a:effectRef idx="0">
-            <a:schemeClr val="accent1"/>
-          </a:effectRef>
-          <a:fontRef idx="minor">
-            <a:schemeClr val="dk1"/>
-          </a:fontRef>
-        </p:style>
-        <p:txBody>
-          <a:bodyPr rot="0" spcFirstLastPara="0" vert="horz" wrap="square" lIns="91440" tIns="45720" rIns="91440" bIns="45720" numCol="1" spcCol="0" rtlCol="0" fromWordArt="0" anchor="t" anchorCtr="0" forceAA="0" compatLnSpc="1">
-            <a:prstTxWarp prst="textNoShape">
-              <a:avLst/>
-            </a:prstTxWarp>
-            <a:noAutofit/>
-          </a:bodyPr>
-          <a:lstStyle/>
-          <a:p>
-            <a:pPr>
-              <a:spcAft>
-                <a:spcPts val="0"/>
-              </a:spcAft>
-            </a:pPr>
-            <a:r>
-              <a:rPr lang="en-GB" sz="300" u="none" strike="noStrike">
-                <a:effectLst/>
-                <a:latin typeface="Arial"/>
-                <a:ea typeface="ＭＳ 明朝"/>
-                <a:cs typeface="Times New Roman"/>
-              </a:rPr>
-              <a:t> </a:t>
-            </a:r>
-            <a:endParaRPr lang="en-GB" sz="1200">
-              <a:effectLst/>
-              <a:ea typeface="ＭＳ 明朝"/>
-              <a:cs typeface="Times New Roman"/>
-            </a:endParaRPr>
-          </a:p>
-          <a:p>
-            <a:pPr>
-              <a:spcAft>
-                <a:spcPts val="0"/>
-              </a:spcAft>
-            </a:pPr>
-            <a:r>
-              <a:rPr lang="en-GB" sz="1000" u="sng">
-                <a:effectLst/>
-                <a:latin typeface="Arial"/>
-                <a:ea typeface="ＭＳ 明朝"/>
-                <a:cs typeface="Times New Roman"/>
-              </a:rPr>
-              <a:t>Figure 3</a:t>
-            </a:r>
-            <a:endParaRPr lang="en-GB" sz="1200">
-              <a:effectLst/>
-              <a:ea typeface="ＭＳ 明朝"/>
-              <a:cs typeface="Times New Roman"/>
-            </a:endParaRPr>
-          </a:p>
-          <a:p>
-            <a:pPr>
-              <a:spcAft>
-                <a:spcPts val="0"/>
-              </a:spcAft>
-            </a:pPr>
-            <a:r>
-              <a:rPr lang="en-GB" sz="1000">
-                <a:effectLst/>
-                <a:latin typeface="Arial"/>
-                <a:ea typeface="ＭＳ 明朝"/>
-                <a:cs typeface="Times New Roman"/>
-              </a:rPr>
-              <a:t>Euler Characteristic plots for ds000001 and ds000109. On top, comparisons of the Euler Characteristics computed after thresholding each software’s T-statistic map from our reproduction analyses using a range of T-values between -6 and 6. Below, comparisons of the Euler Characteristics calculated using the same thresholds on the corresponding T-statistic images obtained via permutation inference within each package.  </a:t>
-            </a:r>
-            <a:endParaRPr lang="en-GB" sz="1200">
-              <a:effectLst/>
-              <a:ea typeface="ＭＳ 明朝"/>
-              <a:cs typeface="Times New Roman"/>
-            </a:endParaRPr>
-          </a:p>
-          <a:p>
-            <a:pPr>
-              <a:spcAft>
-                <a:spcPts val="0"/>
-              </a:spcAft>
-            </a:pPr>
-            <a:r>
-              <a:rPr lang="en-GB" sz="1200">
+          </p:spPr>
+          <p:style>
+            <a:lnRef idx="0">
+              <a:schemeClr val="accent1"/>
+            </a:lnRef>
+            <a:fillRef idx="0">
+              <a:schemeClr val="accent1"/>
+            </a:fillRef>
+            <a:effectRef idx="0">
+              <a:schemeClr val="accent1"/>
+            </a:effectRef>
+            <a:fontRef idx="minor">
+              <a:schemeClr val="dk1"/>
+            </a:fontRef>
+          </p:style>
+          <p:txBody>
+            <a:bodyPr rot="0" spcFirstLastPara="0" vert="horz" wrap="square" lIns="91440" tIns="45720" rIns="91440" bIns="45720" numCol="1" spcCol="0" rtlCol="0" fromWordArt="0" anchor="t" anchorCtr="0" forceAA="0" compatLnSpc="1">
+              <a:prstTxWarp prst="textNoShape">
+                <a:avLst/>
+              </a:prstTxWarp>
+              <a:noAutofit/>
+            </a:bodyPr>
+            <a:lstStyle/>
+            <a:p>
+              <a:pPr>
+                <a:spcAft>
+                  <a:spcPts val="0"/>
+                </a:spcAft>
+              </a:pPr>
+              <a:r>
+                <a:rPr lang="en-GB" sz="300" u="none" strike="noStrike">
+                  <a:effectLst/>
+                  <a:latin typeface="Arial"/>
+                  <a:ea typeface="ＭＳ 明朝"/>
+                  <a:cs typeface="Times New Roman"/>
+                </a:rPr>
+                <a:t> </a:t>
+              </a:r>
+              <a:endParaRPr lang="en-GB" sz="1200">
                 <a:effectLst/>
                 <a:ea typeface="ＭＳ 明朝"/>
                 <a:cs typeface="Times New Roman"/>
-              </a:rPr>
-              <a:t> </a:t>
-            </a:r>
-          </a:p>
-        </p:txBody>
-      </p:sp>
+              </a:endParaRPr>
+            </a:p>
+            <a:p>
+              <a:pPr>
+                <a:spcAft>
+                  <a:spcPts val="0"/>
+                </a:spcAft>
+              </a:pPr>
+              <a:r>
+                <a:rPr lang="en-GB" sz="1000" u="sng">
+                  <a:effectLst/>
+                  <a:latin typeface="Arial"/>
+                  <a:ea typeface="ＭＳ 明朝"/>
+                  <a:cs typeface="Times New Roman"/>
+                </a:rPr>
+                <a:t>Figure 3</a:t>
+              </a:r>
+              <a:endParaRPr lang="en-GB" sz="1200">
+                <a:effectLst/>
+                <a:ea typeface="ＭＳ 明朝"/>
+                <a:cs typeface="Times New Roman"/>
+              </a:endParaRPr>
+            </a:p>
+            <a:p>
+              <a:pPr>
+                <a:spcAft>
+                  <a:spcPts val="0"/>
+                </a:spcAft>
+              </a:pPr>
+              <a:r>
+                <a:rPr lang="en-GB" sz="1000">
+                  <a:effectLst/>
+                  <a:latin typeface="Arial"/>
+                  <a:ea typeface="ＭＳ 明朝"/>
+                  <a:cs typeface="Times New Roman"/>
+                </a:rPr>
+                <a:t>Euler Characteristic plots for ds000001 and ds000109. On top, comparisons of the Euler Characteristics computed after thresholding each software’s T-statistic map from our reproduction analyses using a range of T-values between -6 and 6. Below, comparisons of the Euler Characteristics calculated using the same thresholds on the corresponding T-statistic images obtained via permutation inference within each package.  </a:t>
+              </a:r>
+              <a:endParaRPr lang="en-GB" sz="1200">
+                <a:effectLst/>
+                <a:ea typeface="ＭＳ 明朝"/>
+                <a:cs typeface="Times New Roman"/>
+              </a:endParaRPr>
+            </a:p>
+            <a:p>
+              <a:pPr>
+                <a:spcAft>
+                  <a:spcPts val="0"/>
+                </a:spcAft>
+              </a:pPr>
+              <a:r>
+                <a:rPr lang="en-GB" sz="1200">
+                  <a:effectLst/>
+                  <a:ea typeface="ＭＳ 明朝"/>
+                  <a:cs typeface="Times New Roman"/>
+                </a:rPr>
+                <a:t> </a:t>
+              </a:r>
+            </a:p>
+          </p:txBody>
+        </p:sp>
+      </p:grpSp>
     </p:spTree>
     <p:extLst>
       <p:ext uri="{BB962C8B-B14F-4D97-AF65-F5344CB8AC3E}">

</xml_diff>

<commit_message>
figures converted to pdf, new figures of thresholded and unthresholded stat images
</commit_message>
<xml_diff>
--- a/publication-figures-landscape.pptx
+++ b/publication-figures-landscape.pptx
@@ -289,7 +289,7 @@
           <a:p>
             <a:fld id="{A3E64614-E88D-664F-AD75-0DDFB9446223}" type="datetimeFigureOut">
               <a:rPr lang="en-US" smtClean="0"/>
-              <a:t>07/03/18</a:t>
+              <a:t>12/03/18</a:t>
             </a:fld>
             <a:endParaRPr lang="en-US"/>
           </a:p>
@@ -459,7 +459,7 @@
           <a:p>
             <a:fld id="{A3E64614-E88D-664F-AD75-0DDFB9446223}" type="datetimeFigureOut">
               <a:rPr lang="en-US" smtClean="0"/>
-              <a:t>07/03/18</a:t>
+              <a:t>12/03/18</a:t>
             </a:fld>
             <a:endParaRPr lang="en-US"/>
           </a:p>
@@ -639,7 +639,7 @@
           <a:p>
             <a:fld id="{A3E64614-E88D-664F-AD75-0DDFB9446223}" type="datetimeFigureOut">
               <a:rPr lang="en-US" smtClean="0"/>
-              <a:t>07/03/18</a:t>
+              <a:t>12/03/18</a:t>
             </a:fld>
             <a:endParaRPr lang="en-US"/>
           </a:p>
@@ -809,7 +809,7 @@
           <a:p>
             <a:fld id="{A3E64614-E88D-664F-AD75-0DDFB9446223}" type="datetimeFigureOut">
               <a:rPr lang="en-US" smtClean="0"/>
-              <a:t>07/03/18</a:t>
+              <a:t>12/03/18</a:t>
             </a:fld>
             <a:endParaRPr lang="en-US"/>
           </a:p>
@@ -1055,7 +1055,7 @@
           <a:p>
             <a:fld id="{A3E64614-E88D-664F-AD75-0DDFB9446223}" type="datetimeFigureOut">
               <a:rPr lang="en-US" smtClean="0"/>
-              <a:t>07/03/18</a:t>
+              <a:t>12/03/18</a:t>
             </a:fld>
             <a:endParaRPr lang="en-US"/>
           </a:p>
@@ -1343,7 +1343,7 @@
           <a:p>
             <a:fld id="{A3E64614-E88D-664F-AD75-0DDFB9446223}" type="datetimeFigureOut">
               <a:rPr lang="en-US" smtClean="0"/>
-              <a:t>07/03/18</a:t>
+              <a:t>12/03/18</a:t>
             </a:fld>
             <a:endParaRPr lang="en-US"/>
           </a:p>
@@ -1765,7 +1765,7 @@
           <a:p>
             <a:fld id="{A3E64614-E88D-664F-AD75-0DDFB9446223}" type="datetimeFigureOut">
               <a:rPr lang="en-US" smtClean="0"/>
-              <a:t>07/03/18</a:t>
+              <a:t>12/03/18</a:t>
             </a:fld>
             <a:endParaRPr lang="en-US"/>
           </a:p>
@@ -1883,7 +1883,7 @@
           <a:p>
             <a:fld id="{A3E64614-E88D-664F-AD75-0DDFB9446223}" type="datetimeFigureOut">
               <a:rPr lang="en-US" smtClean="0"/>
-              <a:t>07/03/18</a:t>
+              <a:t>12/03/18</a:t>
             </a:fld>
             <a:endParaRPr lang="en-US"/>
           </a:p>
@@ -1978,7 +1978,7 @@
           <a:p>
             <a:fld id="{A3E64614-E88D-664F-AD75-0DDFB9446223}" type="datetimeFigureOut">
               <a:rPr lang="en-US" smtClean="0"/>
-              <a:t>07/03/18</a:t>
+              <a:t>12/03/18</a:t>
             </a:fld>
             <a:endParaRPr lang="en-US"/>
           </a:p>
@@ -2255,7 +2255,7 @@
           <a:p>
             <a:fld id="{A3E64614-E88D-664F-AD75-0DDFB9446223}" type="datetimeFigureOut">
               <a:rPr lang="en-US" smtClean="0"/>
-              <a:t>07/03/18</a:t>
+              <a:t>12/03/18</a:t>
             </a:fld>
             <a:endParaRPr lang="en-US"/>
           </a:p>
@@ -2508,7 +2508,7 @@
           <a:p>
             <a:fld id="{A3E64614-E88D-664F-AD75-0DDFB9446223}" type="datetimeFigureOut">
               <a:rPr lang="en-US" smtClean="0"/>
-              <a:t>07/03/18</a:t>
+              <a:t>12/03/18</a:t>
             </a:fld>
             <a:endParaRPr lang="en-US"/>
           </a:p>
@@ -2721,7 +2721,7 @@
           <a:p>
             <a:fld id="{A3E64614-E88D-664F-AD75-0DDFB9446223}" type="datetimeFigureOut">
               <a:rPr lang="en-US" smtClean="0"/>
-              <a:t>07/03/18</a:t>
+              <a:t>12/03/18</a:t>
             </a:fld>
             <a:endParaRPr lang="en-US"/>
           </a:p>
@@ -3105,9 +3105,9 @@
         <p:grpSpPr>
           <a:xfrm>
             <a:off x="1236346" y="360694"/>
-            <a:ext cx="7470140" cy="6169660"/>
+            <a:ext cx="7470140" cy="5926571"/>
             <a:chOff x="1236346" y="360694"/>
-            <a:chExt cx="7470140" cy="6169660"/>
+            <a:chExt cx="7470140" cy="5926571"/>
           </a:xfrm>
         </p:grpSpPr>
         <p:pic>
@@ -3152,7 +3152,7 @@
           <p:spPr>
             <a:xfrm>
               <a:off x="1352551" y="5501654"/>
-              <a:ext cx="7200900" cy="1028700"/>
+              <a:ext cx="7200900" cy="785611"/>
             </a:xfrm>
             <a:prstGeom prst="rect">
               <a:avLst/>
@@ -3263,25 +3263,52 @@
                   <a:ea typeface="ＭＳ 明朝"/>
                   <a:cs typeface="Times New Roman"/>
                 </a:rPr>
-                <a:t> positive and negative T-statistic maps computed using each software package and inference method for each of the three reproduced studies.  Dice is the size of the overlapping region of two images divided by the average size of each region. In this context, a Dice coefficient of 1 would indicate perfect agreement between software on the regions of significant activation, whereas a coefficient of 0 would imply that no voxel was declared significant in both packages after </a:t>
+                <a:t> positive and negative T-statistic maps computed using each software package and inference method for each of the three reproduced studies.  </a:t>
               </a:r>
               <a:r>
-                <a:rPr lang="en-GB" sz="1000" dirty="0" err="1">
+                <a:rPr lang="en-GB" sz="1000" dirty="0" smtClean="0">
                   <a:effectLst/>
                   <a:latin typeface="Arial"/>
                   <a:ea typeface="ＭＳ 明朝"/>
                   <a:cs typeface="Times New Roman"/>
                 </a:rPr>
-                <a:t>thresholding</a:t>
+                <a:t>Only one software </a:t>
               </a:r>
               <a:r>
-                <a:rPr lang="en-GB" sz="1000" dirty="0">
+                <a:rPr lang="mr-IN" sz="1000" dirty="0" smtClean="0">
                   <a:effectLst/>
                   <a:latin typeface="Arial"/>
                   <a:ea typeface="ＭＳ 明朝"/>
                   <a:cs typeface="Times New Roman"/>
                 </a:rPr>
-                <a:t> the T-statistic images. </a:t>
+                <a:t>–</a:t>
+              </a:r>
+              <a:r>
+                <a:rPr lang="en-GB" sz="1000" dirty="0" smtClean="0">
+                  <a:effectLst/>
+                  <a:latin typeface="Arial"/>
+                  <a:ea typeface="ＭＳ 明朝"/>
+                  <a:cs typeface="Times New Roman"/>
+                </a:rPr>
+                <a:t> FSL parametric </a:t>
+              </a:r>
+              <a:r>
+                <a:rPr lang="mr-IN" sz="1000" dirty="0" smtClean="0">
+                  <a:effectLst/>
+                  <a:latin typeface="Arial"/>
+                  <a:ea typeface="ＭＳ 明朝"/>
+                  <a:cs typeface="Times New Roman"/>
+                </a:rPr>
+                <a:t>–</a:t>
+              </a:r>
+              <a:r>
+                <a:rPr lang="en-GB" sz="1000" dirty="0" smtClean="0">
+                  <a:effectLst/>
+                  <a:latin typeface="Arial"/>
+                  <a:ea typeface="ＭＳ 明朝"/>
+                  <a:cs typeface="Times New Roman"/>
+                </a:rPr>
+                <a:t> obtained a result for decreases in ds000109, and hence no Dice coefficients are shown. </a:t>
               </a:r>
               <a:endParaRPr lang="en-GB" sz="1200" dirty="0">
                 <a:effectLst/>
@@ -3438,7 +3465,7 @@
                 </a:spcAft>
               </a:pPr>
               <a:r>
-                <a:rPr lang="en-GB" sz="300" u="none" strike="noStrike">
+                <a:rPr lang="en-GB" sz="300" u="none" strike="noStrike" dirty="0">
                   <a:effectLst/>
                   <a:latin typeface="Arial"/>
                   <a:ea typeface="ＭＳ 明朝"/>
@@ -3446,7 +3473,7 @@
                 </a:rPr>
                 <a:t> </a:t>
               </a:r>
-              <a:endParaRPr lang="en-GB" sz="1200">
+              <a:endParaRPr lang="en-GB" sz="1200" dirty="0">
                 <a:effectLst/>
                 <a:ea typeface="ＭＳ 明朝"/>
                 <a:cs typeface="Times New Roman"/>
@@ -3459,7 +3486,7 @@
                 </a:spcAft>
               </a:pPr>
               <a:r>
-                <a:rPr lang="en-GB" sz="1000" u="sng">
+                <a:rPr lang="en-GB" sz="1000" u="sng" dirty="0">
                   <a:effectLst/>
                   <a:latin typeface="Arial"/>
                   <a:ea typeface="ＭＳ 明朝"/>
@@ -3467,7 +3494,7 @@
                 </a:rPr>
                 <a:t>Figure 3</a:t>
               </a:r>
-              <a:endParaRPr lang="en-GB" sz="1200">
+              <a:endParaRPr lang="en-GB" sz="1200" dirty="0">
                 <a:effectLst/>
                 <a:ea typeface="ＭＳ 明朝"/>
                 <a:cs typeface="Times New Roman"/>
@@ -3480,15 +3507,102 @@
                 </a:spcAft>
               </a:pPr>
               <a:r>
-                <a:rPr lang="en-GB" sz="1000">
+                <a:rPr lang="en-GB" sz="1000" dirty="0">
                   <a:effectLst/>
                   <a:latin typeface="Arial"/>
                   <a:ea typeface="ＭＳ 明朝"/>
                   <a:cs typeface="Times New Roman"/>
                 </a:rPr>
-                <a:t>Euler Characteristic plots for ds000001 and ds000109. On top, comparisons of the Euler Characteristics computed after thresholding each software’s T-statistic map from our reproduction analyses using a range of T-values between -6 and 6. Below, comparisons of the Euler Characteristics calculated using the same thresholds on the corresponding T-statistic images obtained via permutation inference within each package.  </a:t>
+                <a:t>Euler Characteristic plots for ds000001 and ds000109. On top, comparisons of the Euler Characteristics computed after </a:t>
               </a:r>
-              <a:endParaRPr lang="en-GB" sz="1200">
+              <a:r>
+                <a:rPr lang="en-GB" sz="1000" dirty="0" err="1">
+                  <a:effectLst/>
+                  <a:latin typeface="Arial"/>
+                  <a:ea typeface="ＭＳ 明朝"/>
+                  <a:cs typeface="Times New Roman"/>
+                </a:rPr>
+                <a:t>thresholding</a:t>
+              </a:r>
+              <a:r>
+                <a:rPr lang="en-GB" sz="1000" dirty="0">
+                  <a:effectLst/>
+                  <a:latin typeface="Arial"/>
+                  <a:ea typeface="ＭＳ 明朝"/>
+                  <a:cs typeface="Times New Roman"/>
+                </a:rPr>
+                <a:t> each software’s T-statistic map from our </a:t>
+              </a:r>
+              <a:r>
+                <a:rPr lang="en-GB" sz="1000" dirty="0" smtClean="0">
+                  <a:effectLst/>
+                  <a:latin typeface="Arial"/>
+                  <a:ea typeface="ＭＳ 明朝"/>
+                  <a:cs typeface="Times New Roman"/>
+                </a:rPr>
+                <a:t>replication </a:t>
+              </a:r>
+              <a:r>
+                <a:rPr lang="en-GB" sz="1000" dirty="0">
+                  <a:effectLst/>
+                  <a:latin typeface="Arial"/>
+                  <a:ea typeface="ＭＳ 明朝"/>
+                  <a:cs typeface="Times New Roman"/>
+                </a:rPr>
+                <a:t>analyses using a range of T-values between -6 and 6. Below, comparisons of the Euler Characteristics calculated using the same thresholds on the corresponding T-statistic images </a:t>
+              </a:r>
+              <a:r>
+                <a:rPr lang="en-GB" sz="1000" dirty="0" smtClean="0">
+                  <a:effectLst/>
+                  <a:latin typeface="Arial"/>
+                  <a:ea typeface="ＭＳ 明朝"/>
+                  <a:cs typeface="Times New Roman"/>
+                </a:rPr>
+                <a:t>for permutation </a:t>
+              </a:r>
+              <a:r>
+                <a:rPr lang="en-GB" sz="1000" dirty="0">
+                  <a:effectLst/>
+                  <a:latin typeface="Arial"/>
+                  <a:ea typeface="ＭＳ 明朝"/>
+                  <a:cs typeface="Times New Roman"/>
+                </a:rPr>
+                <a:t>inference within each </a:t>
+              </a:r>
+              <a:r>
+                <a:rPr lang="en-GB" sz="1000" dirty="0" smtClean="0">
+                  <a:effectLst/>
+                  <a:latin typeface="Arial"/>
+                  <a:ea typeface="ＭＳ 明朝"/>
+                  <a:cs typeface="Times New Roman"/>
+                </a:rPr>
+                <a:t>package</a:t>
+              </a:r>
+              <a:r>
+                <a:rPr lang="en-GB" sz="1000" dirty="0" smtClean="0">
+                  <a:latin typeface="Arial"/>
+                  <a:ea typeface="ＭＳ 明朝"/>
+                  <a:cs typeface="Times New Roman"/>
+                </a:rPr>
+                <a:t>. For each T-value the Euler Characteristics summarises the topology of the </a:t>
+              </a:r>
+              <a:r>
+                <a:rPr lang="en-GB" sz="1000" dirty="0" err="1" smtClean="0">
+                  <a:latin typeface="Arial"/>
+                  <a:ea typeface="ＭＳ 明朝"/>
+                  <a:cs typeface="Times New Roman"/>
+                </a:rPr>
+                <a:t>thresholded</a:t>
+              </a:r>
+              <a:r>
+                <a:rPr lang="en-GB" sz="1000" dirty="0" smtClean="0">
+                  <a:latin typeface="Arial"/>
+                  <a:ea typeface="ＭＳ 明朝"/>
+                  <a:cs typeface="Times New Roman"/>
+                </a:rPr>
+                <a:t> image, and the curves provide a signature of the structure of the entire image.</a:t>
+              </a:r>
+              <a:endParaRPr lang="en-GB" sz="1200" dirty="0">
                 <a:effectLst/>
                 <a:ea typeface="ＭＳ 明朝"/>
                 <a:cs typeface="Times New Roman"/>
@@ -3501,7 +3615,7 @@
                 </a:spcAft>
               </a:pPr>
               <a:r>
-                <a:rPr lang="en-GB" sz="1200">
+                <a:rPr lang="en-GB" sz="1200" dirty="0">
                   <a:effectLst/>
                   <a:ea typeface="ＭＳ 明朝"/>
                   <a:cs typeface="Times New Roman"/>

</xml_diff>